<commit_message>
MAJ DIAPO et COMPTE RENDU d'ACTIVITE
</commit_message>
<xml_diff>
--- a/Nathan/Compte-rendus/REVUE-R1-GUIGAND-SFL6.pptx
+++ b/Nathan/Compte-rendus/REVUE-R1-GUIGAND-SFL6.pptx
@@ -7204,10 +7204,19 @@
           <a:p>
             <a:pPr algn="ctr"/>
             <a:r>
+              <a:rPr lang="fr-FR" sz="1600" b="1" dirty="0">
+                <a:solidFill>
+                  <a:srgbClr val="A31257"/>
+                </a:solidFill>
+                <a:latin typeface="Eras Medium ITC" panose="020B0602030504020804" pitchFamily="34" charset="0"/>
+              </a:rPr>
+              <a:t>GUIGAND Nathan </a:t>
+            </a:r>
+            <a:r>
               <a:rPr lang="fr-FR" sz="1600" dirty="0">
                 <a:latin typeface="Eras Medium ITC" panose="020B0602030504020804" pitchFamily="34" charset="0"/>
               </a:rPr>
-              <a:t>GUIGAND Nathan -- MONVOISIN Guillaume -- DOHIN Cyril</a:t>
+              <a:t>-- MONVOISIN Guillaume -- DOHIN Cyril</a:t>
             </a:r>
           </a:p>
         </p:txBody>

</xml_diff>

<commit_message>
MAJ du Rapport d'Activité, MAJ du diaporama
</commit_message>
<xml_diff>
--- a/Nathan/Compte-rendus/REVUE-R1-GUIGAND-SFL6.pptx
+++ b/Nathan/Compte-rendus/REVUE-R1-GUIGAND-SFL6.pptx
@@ -204,7 +204,7 @@
           <a:p>
             <a:fld id="{8F776215-2538-4AC2-BB65-76E63FC63770}" type="datetimeFigureOut">
               <a:rPr lang="fr-FR" smtClean="0"/>
-              <a:t>28/01/2020</a:t>
+              <a:t>29/01/2020</a:t>
             </a:fld>
             <a:endParaRPr lang="fr-FR"/>
           </a:p>
@@ -1194,7 +1194,7 @@
             <a:fld id="{B61BEF0D-F0BB-DE4B-95CE-6DB70DBA9567}" type="datetimeFigureOut">
               <a:rPr lang="en-US" smtClean="0"/>
               <a:pPr/>
-              <a:t>1/28/2020</a:t>
+              <a:t>1/29/2020</a:t>
             </a:fld>
             <a:endParaRPr lang="en-US" dirty="0"/>
           </a:p>
@@ -1442,7 +1442,7 @@
             <a:fld id="{B61BEF0D-F0BB-DE4B-95CE-6DB70DBA9567}" type="datetimeFigureOut">
               <a:rPr lang="en-US" smtClean="0"/>
               <a:pPr/>
-              <a:t>1/28/2020</a:t>
+              <a:t>1/29/2020</a:t>
             </a:fld>
             <a:endParaRPr lang="en-US" dirty="0"/>
           </a:p>
@@ -1753,7 +1753,7 @@
             <a:fld id="{B61BEF0D-F0BB-DE4B-95CE-6DB70DBA9567}" type="datetimeFigureOut">
               <a:rPr lang="en-US" smtClean="0"/>
               <a:pPr/>
-              <a:t>1/28/2020</a:t>
+              <a:t>1/29/2020</a:t>
             </a:fld>
             <a:endParaRPr lang="en-US" dirty="0"/>
           </a:p>
@@ -2091,7 +2091,7 @@
             <a:fld id="{B61BEF0D-F0BB-DE4B-95CE-6DB70DBA9567}" type="datetimeFigureOut">
               <a:rPr lang="en-US" smtClean="0"/>
               <a:pPr/>
-              <a:t>1/28/2020</a:t>
+              <a:t>1/29/2020</a:t>
             </a:fld>
             <a:endParaRPr lang="en-US" dirty="0"/>
           </a:p>
@@ -2402,7 +2402,7 @@
             <a:fld id="{B61BEF0D-F0BB-DE4B-95CE-6DB70DBA9567}" type="datetimeFigureOut">
               <a:rPr lang="en-US" smtClean="0"/>
               <a:pPr/>
-              <a:t>1/28/2020</a:t>
+              <a:t>1/29/2020</a:t>
             </a:fld>
             <a:endParaRPr lang="en-US" dirty="0"/>
           </a:p>
@@ -2792,7 +2792,7 @@
             <a:fld id="{B61BEF0D-F0BB-DE4B-95CE-6DB70DBA9567}" type="datetimeFigureOut">
               <a:rPr lang="en-US" smtClean="0"/>
               <a:pPr/>
-              <a:t>1/28/2020</a:t>
+              <a:t>1/29/2020</a:t>
             </a:fld>
             <a:endParaRPr lang="en-US" dirty="0"/>
           </a:p>
@@ -2958,7 +2958,7 @@
           <a:p>
             <a:fld id="{55C6B4A9-1611-4792-9094-5F34BCA07E0B}" type="datetimeFigureOut">
               <a:rPr lang="en-US" smtClean="0"/>
-              <a:t>1/28/2020</a:t>
+              <a:t>1/29/2020</a:t>
             </a:fld>
             <a:endParaRPr lang="en-US" dirty="0"/>
           </a:p>
@@ -3134,7 +3134,7 @@
             <a:fld id="{B61BEF0D-F0BB-DE4B-95CE-6DB70DBA9567}" type="datetimeFigureOut">
               <a:rPr lang="en-US" smtClean="0"/>
               <a:pPr/>
-              <a:t>1/28/2020</a:t>
+              <a:t>1/29/2020</a:t>
             </a:fld>
             <a:endParaRPr lang="en-US" dirty="0"/>
           </a:p>
@@ -3307,7 +3307,7 @@
             <a:fld id="{B61BEF0D-F0BB-DE4B-95CE-6DB70DBA9567}" type="datetimeFigureOut">
               <a:rPr lang="en-US" smtClean="0"/>
               <a:pPr/>
-              <a:t>1/28/2020</a:t>
+              <a:t>1/29/2020</a:t>
             </a:fld>
             <a:endParaRPr lang="en-US" dirty="0"/>
           </a:p>
@@ -3551,7 +3551,7 @@
             <a:fld id="{B61BEF0D-F0BB-DE4B-95CE-6DB70DBA9567}" type="datetimeFigureOut">
               <a:rPr lang="en-US" smtClean="0"/>
               <a:pPr/>
-              <a:t>1/28/2020</a:t>
+              <a:t>1/29/2020</a:t>
             </a:fld>
             <a:endParaRPr lang="en-US" dirty="0"/>
           </a:p>
@@ -3779,7 +3779,7 @@
           <a:p>
             <a:fld id="{EB712588-04B1-427B-82EE-E8DB90309F08}" type="datetimeFigureOut">
               <a:rPr lang="en-US" smtClean="0"/>
-              <a:t>1/28/2020</a:t>
+              <a:t>1/29/2020</a:t>
             </a:fld>
             <a:endParaRPr lang="en-US" dirty="0"/>
           </a:p>
@@ -4149,7 +4149,7 @@
             <a:fld id="{B61BEF0D-F0BB-DE4B-95CE-6DB70DBA9567}" type="datetimeFigureOut">
               <a:rPr lang="en-US" smtClean="0"/>
               <a:pPr/>
-              <a:t>1/28/2020</a:t>
+              <a:t>1/29/2020</a:t>
             </a:fld>
             <a:endParaRPr lang="en-US" dirty="0"/>
           </a:p>
@@ -4269,7 +4269,7 @@
             <a:fld id="{B61BEF0D-F0BB-DE4B-95CE-6DB70DBA9567}" type="datetimeFigureOut">
               <a:rPr lang="en-US" smtClean="0"/>
               <a:pPr/>
-              <a:t>1/28/2020</a:t>
+              <a:t>1/29/2020</a:t>
             </a:fld>
             <a:endParaRPr lang="en-US" dirty="0"/>
           </a:p>
@@ -4361,7 +4361,7 @@
             <a:fld id="{B61BEF0D-F0BB-DE4B-95CE-6DB70DBA9567}" type="datetimeFigureOut">
               <a:rPr lang="en-US" smtClean="0"/>
               <a:pPr/>
-              <a:t>1/28/2020</a:t>
+              <a:t>1/29/2020</a:t>
             </a:fld>
             <a:endParaRPr lang="en-US" dirty="0"/>
           </a:p>
@@ -4612,7 +4612,7 @@
           <a:p>
             <a:fld id="{42A54C80-263E-416B-A8E0-580EDEADCBDC}" type="datetimeFigureOut">
               <a:rPr lang="en-US" smtClean="0"/>
-              <a:t>1/28/2020</a:t>
+              <a:t>1/29/2020</a:t>
             </a:fld>
             <a:endParaRPr lang="en-US" dirty="0"/>
           </a:p>
@@ -4871,7 +4871,7 @@
             <a:fld id="{B61BEF0D-F0BB-DE4B-95CE-6DB70DBA9567}" type="datetimeFigureOut">
               <a:rPr lang="en-US" smtClean="0"/>
               <a:pPr/>
-              <a:t>1/28/2020</a:t>
+              <a:t>1/29/2020</a:t>
             </a:fld>
             <a:endParaRPr lang="en-US" dirty="0"/>
           </a:p>
@@ -5611,7 +5611,7 @@
             <a:fld id="{B61BEF0D-F0BB-DE4B-95CE-6DB70DBA9567}" type="datetimeFigureOut">
               <a:rPr lang="en-US" smtClean="0"/>
               <a:pPr/>
-              <a:t>1/28/2020</a:t>
+              <a:t>1/29/2020</a:t>
             </a:fld>
             <a:endParaRPr lang="en-US" dirty="0"/>
           </a:p>
@@ -7441,7 +7441,9 @@
             </a:schemeClr>
           </a:solidFill>
           <a:ln>
-            <a:noFill/>
+            <a:solidFill>
+              <a:srgbClr val="E4BB46"/>
+            </a:solidFill>
           </a:ln>
         </p:spPr>
         <p:style>
@@ -7496,7 +7498,9 @@
             </a:schemeClr>
           </a:solidFill>
           <a:ln>
-            <a:noFill/>
+            <a:solidFill>
+              <a:srgbClr val="E4BB46"/>
+            </a:solidFill>
           </a:ln>
         </p:spPr>
         <p:style>
@@ -7551,7 +7555,9 @@
             </a:schemeClr>
           </a:solidFill>
           <a:ln>
-            <a:noFill/>
+            <a:solidFill>
+              <a:srgbClr val="E4BB46"/>
+            </a:solidFill>
           </a:ln>
         </p:spPr>
         <p:style>
@@ -7606,7 +7612,9 @@
             </a:schemeClr>
           </a:solidFill>
           <a:ln>
-            <a:noFill/>
+            <a:solidFill>
+              <a:srgbClr val="E4BB46"/>
+            </a:solidFill>
           </a:ln>
         </p:spPr>
         <p:style>
@@ -7661,7 +7669,9 @@
             </a:schemeClr>
           </a:solidFill>
           <a:ln>
-            <a:noFill/>
+            <a:solidFill>
+              <a:srgbClr val="E4BB46"/>
+            </a:solidFill>
           </a:ln>
         </p:spPr>
         <p:style>
@@ -7716,7 +7726,9 @@
             </a:schemeClr>
           </a:solidFill>
           <a:ln>
-            <a:noFill/>
+            <a:solidFill>
+              <a:srgbClr val="E4BB46"/>
+            </a:solidFill>
           </a:ln>
         </p:spPr>
         <p:style>
@@ -7771,7 +7783,9 @@
             </a:schemeClr>
           </a:solidFill>
           <a:ln>
-            <a:noFill/>
+            <a:solidFill>
+              <a:srgbClr val="E4BB46"/>
+            </a:solidFill>
           </a:ln>
         </p:spPr>
         <p:style>
@@ -8057,6 +8071,60 @@
           <a:chExt cx="0" cy="0"/>
         </a:xfrm>
       </p:grpSpPr>
+      <p:sp>
+        <p:nvSpPr>
+          <p:cNvPr id="15" name="Organigramme : Terminateur 14">
+            <a:extLst>
+              <a:ext uri="{FF2B5EF4-FFF2-40B4-BE49-F238E27FC236}">
+                <a16:creationId xmlns:a16="http://schemas.microsoft.com/office/drawing/2014/main" id="{DEF7F1BD-53A2-411D-9DC1-226DB21C959D}"/>
+              </a:ext>
+            </a:extLst>
+          </p:cNvPr>
+          <p:cNvSpPr/>
+          <p:nvPr/>
+        </p:nvSpPr>
+        <p:spPr>
+          <a:xfrm>
+            <a:off x="11562541" y="1448372"/>
+            <a:ext cx="188499" cy="71437"/>
+          </a:xfrm>
+          <a:prstGeom prst="flowChartTerminator">
+            <a:avLst/>
+          </a:prstGeom>
+          <a:solidFill>
+            <a:srgbClr val="A31257"/>
+          </a:solidFill>
+          <a:ln>
+            <a:solidFill>
+              <a:schemeClr val="bg1"/>
+            </a:solidFill>
+          </a:ln>
+        </p:spPr>
+        <p:style>
+          <a:lnRef idx="2">
+            <a:schemeClr val="accent1">
+              <a:shade val="50000"/>
+            </a:schemeClr>
+          </a:lnRef>
+          <a:fillRef idx="1">
+            <a:schemeClr val="accent1"/>
+          </a:fillRef>
+          <a:effectRef idx="0">
+            <a:schemeClr val="accent1"/>
+          </a:effectRef>
+          <a:fontRef idx="minor">
+            <a:schemeClr val="lt1"/>
+          </a:fontRef>
+        </p:style>
+        <p:txBody>
+          <a:bodyPr rtlCol="0" anchor="ctr"/>
+          <a:lstStyle/>
+          <a:p>
+            <a:pPr algn="ctr"/>
+            <a:endParaRPr lang="fr-FR"/>
+          </a:p>
+        </p:txBody>
+      </p:sp>
       <p:pic>
         <p:nvPicPr>
           <p:cNvPr id="1026" name="Picture 2" descr="Image associée">
@@ -8276,7 +8344,9 @@
             <a:schemeClr val="bg1"/>
           </a:solidFill>
           <a:ln>
-            <a:noFill/>
+            <a:solidFill>
+              <a:schemeClr val="bg1"/>
+            </a:solidFill>
           </a:ln>
         </p:spPr>
         <p:style>
@@ -8306,10 +8376,10 @@
       </p:sp>
       <p:sp>
         <p:nvSpPr>
-          <p:cNvPr id="9" name="Ellipse 8">
+          <p:cNvPr id="12" name="Ellipse 11">
             <a:extLst>
               <a:ext uri="{FF2B5EF4-FFF2-40B4-BE49-F238E27FC236}">
-                <a16:creationId xmlns:a16="http://schemas.microsoft.com/office/drawing/2014/main" id="{CE87EE90-A0D4-4C9A-8C57-2C006C6BB615}"/>
+                <a16:creationId xmlns:a16="http://schemas.microsoft.com/office/drawing/2014/main" id="{ED821AF8-1866-4DB0-B4A6-1667763CCAC1}"/>
               </a:ext>
             </a:extLst>
           </p:cNvPr>
@@ -8318,17 +8388,19 @@
         </p:nvSpPr>
         <p:spPr>
           <a:xfrm>
-            <a:off x="11530584" y="570246"/>
+            <a:off x="11530583" y="2798334"/>
             <a:ext cx="400813" cy="366747"/>
           </a:xfrm>
           <a:prstGeom prst="ellipse">
             <a:avLst/>
           </a:prstGeom>
           <a:solidFill>
-            <a:srgbClr val="009900"/>
+            <a:schemeClr val="bg1"/>
           </a:solidFill>
           <a:ln>
-            <a:noFill/>
+            <a:solidFill>
+              <a:schemeClr val="bg1"/>
+            </a:solidFill>
           </a:ln>
         </p:spPr>
         <p:style>
@@ -8358,10 +8430,10 @@
       </p:sp>
       <p:sp>
         <p:nvSpPr>
-          <p:cNvPr id="12" name="Ellipse 11">
+          <p:cNvPr id="13" name="Ellipse 12">
             <a:extLst>
               <a:ext uri="{FF2B5EF4-FFF2-40B4-BE49-F238E27FC236}">
-                <a16:creationId xmlns:a16="http://schemas.microsoft.com/office/drawing/2014/main" id="{ED821AF8-1866-4DB0-B4A6-1667763CCAC1}"/>
+                <a16:creationId xmlns:a16="http://schemas.microsoft.com/office/drawing/2014/main" id="{F02ECFAD-820A-4940-8ABC-B95DE3252CE2}"/>
               </a:ext>
             </a:extLst>
           </p:cNvPr>
@@ -8370,7 +8442,7 @@
         </p:nvSpPr>
         <p:spPr>
           <a:xfrm>
-            <a:off x="11530583" y="2798334"/>
+            <a:off x="11530582" y="4331478"/>
             <a:ext cx="400813" cy="366747"/>
           </a:xfrm>
           <a:prstGeom prst="ellipse">
@@ -8380,7 +8452,9 @@
             <a:schemeClr val="bg1"/>
           </a:solidFill>
           <a:ln>
-            <a:noFill/>
+            <a:solidFill>
+              <a:schemeClr val="bg1"/>
+            </a:solidFill>
           </a:ln>
         </p:spPr>
         <p:style>
@@ -8410,10 +8484,10 @@
       </p:sp>
       <p:sp>
         <p:nvSpPr>
-          <p:cNvPr id="13" name="Ellipse 12">
+          <p:cNvPr id="14" name="Ellipse 13">
             <a:extLst>
               <a:ext uri="{FF2B5EF4-FFF2-40B4-BE49-F238E27FC236}">
-                <a16:creationId xmlns:a16="http://schemas.microsoft.com/office/drawing/2014/main" id="{F02ECFAD-820A-4940-8ABC-B95DE3252CE2}"/>
+                <a16:creationId xmlns:a16="http://schemas.microsoft.com/office/drawing/2014/main" id="{4B69E0F2-2894-43B2-AE2F-FEC209C7AC33}"/>
               </a:ext>
             </a:extLst>
           </p:cNvPr>
@@ -8422,7 +8496,7 @@
         </p:nvSpPr>
         <p:spPr>
           <a:xfrm>
-            <a:off x="11530582" y="4331478"/>
+            <a:off x="11530581" y="5863858"/>
             <a:ext cx="400813" cy="366747"/>
           </a:xfrm>
           <a:prstGeom prst="ellipse">
@@ -8432,7 +8506,9 @@
             <a:schemeClr val="bg1"/>
           </a:solidFill>
           <a:ln>
-            <a:noFill/>
+            <a:solidFill>
+              <a:schemeClr val="bg1"/>
+            </a:solidFill>
           </a:ln>
         </p:spPr>
         <p:style>
@@ -8462,10 +8538,10 @@
       </p:sp>
       <p:sp>
         <p:nvSpPr>
-          <p:cNvPr id="14" name="Ellipse 13">
+          <p:cNvPr id="17" name="Organigramme : Terminateur 16">
             <a:extLst>
               <a:ext uri="{FF2B5EF4-FFF2-40B4-BE49-F238E27FC236}">
-                <a16:creationId xmlns:a16="http://schemas.microsoft.com/office/drawing/2014/main" id="{4B69E0F2-2894-43B2-AE2F-FEC209C7AC33}"/>
+                <a16:creationId xmlns:a16="http://schemas.microsoft.com/office/drawing/2014/main" id="{72E41086-A62D-4CF5-B7DB-B0A89BC049A2}"/>
               </a:ext>
             </a:extLst>
           </p:cNvPr>
@@ -8474,17 +8550,19 @@
         </p:nvSpPr>
         <p:spPr>
           <a:xfrm>
-            <a:off x="11530581" y="5863858"/>
-            <a:ext cx="400813" cy="366747"/>
-          </a:xfrm>
-          <a:prstGeom prst="ellipse">
+            <a:off x="11570685" y="2179226"/>
+            <a:ext cx="188499" cy="71437"/>
+          </a:xfrm>
+          <a:prstGeom prst="flowChartTerminator">
             <a:avLst/>
           </a:prstGeom>
           <a:solidFill>
             <a:schemeClr val="bg1"/>
           </a:solidFill>
           <a:ln>
-            <a:noFill/>
+            <a:solidFill>
+              <a:schemeClr val="bg1"/>
+            </a:solidFill>
           </a:ln>
         </p:spPr>
         <p:style>
@@ -8514,10 +8592,234 @@
       </p:sp>
       <p:sp>
         <p:nvSpPr>
-          <p:cNvPr id="15" name="Organigramme : Terminateur 14">
+          <p:cNvPr id="16" name="ZoneTexte 15">
             <a:extLst>
               <a:ext uri="{FF2B5EF4-FFF2-40B4-BE49-F238E27FC236}">
-                <a16:creationId xmlns:a16="http://schemas.microsoft.com/office/drawing/2014/main" id="{DEF7F1BD-53A2-411D-9DC1-226DB21C959D}"/>
+                <a16:creationId xmlns:a16="http://schemas.microsoft.com/office/drawing/2014/main" id="{F7857BB6-E342-4747-9425-F3E9DD2ADBD3}"/>
+              </a:ext>
+            </a:extLst>
+          </p:cNvPr>
+          <p:cNvSpPr txBox="1"/>
+          <p:nvPr/>
+        </p:nvSpPr>
+        <p:spPr>
+          <a:xfrm>
+            <a:off x="10197081" y="537591"/>
+            <a:ext cx="1333500" cy="430887"/>
+          </a:xfrm>
+          <a:prstGeom prst="rect">
+            <a:avLst/>
+          </a:prstGeom>
+          <a:noFill/>
+        </p:spPr>
+        <p:txBody>
+          <a:bodyPr wrap="square" rtlCol="0">
+            <a:spAutoFit/>
+          </a:bodyPr>
+          <a:lstStyle/>
+          <a:p>
+            <a:pPr algn="r"/>
+            <a:r>
+              <a:rPr lang="fr-FR" sz="1100" dirty="0">
+                <a:solidFill>
+                  <a:srgbClr val="A41258"/>
+                </a:solidFill>
+              </a:rPr>
+              <a:t>Présentation du projet</a:t>
+            </a:r>
+          </a:p>
+        </p:txBody>
+      </p:sp>
+      <p:sp>
+        <p:nvSpPr>
+          <p:cNvPr id="19" name="ZoneTexte 18">
+            <a:extLst>
+              <a:ext uri="{FF2B5EF4-FFF2-40B4-BE49-F238E27FC236}">
+                <a16:creationId xmlns:a16="http://schemas.microsoft.com/office/drawing/2014/main" id="{C6736818-D057-4050-AB8A-3E2BF2159972}"/>
+              </a:ext>
+            </a:extLst>
+          </p:cNvPr>
+          <p:cNvSpPr txBox="1"/>
+          <p:nvPr/>
+        </p:nvSpPr>
+        <p:spPr>
+          <a:xfrm>
+            <a:off x="10295358" y="1353285"/>
+            <a:ext cx="1275327" cy="261610"/>
+          </a:xfrm>
+          <a:prstGeom prst="rect">
+            <a:avLst/>
+          </a:prstGeom>
+          <a:noFill/>
+        </p:spPr>
+        <p:txBody>
+          <a:bodyPr wrap="square" rtlCol="0">
+            <a:spAutoFit/>
+          </a:bodyPr>
+          <a:lstStyle/>
+          <a:p>
+            <a:pPr algn="r"/>
+            <a:r>
+              <a:rPr lang="fr-FR" sz="1100" dirty="0">
+                <a:solidFill>
+                  <a:srgbClr val="A41258"/>
+                </a:solidFill>
+              </a:rPr>
+              <a:t>Schéma global</a:t>
+            </a:r>
+          </a:p>
+        </p:txBody>
+      </p:sp>
+      <p:sp>
+        <p:nvSpPr>
+          <p:cNvPr id="20" name="ZoneTexte 19">
+            <a:extLst>
+              <a:ext uri="{FF2B5EF4-FFF2-40B4-BE49-F238E27FC236}">
+                <a16:creationId xmlns:a16="http://schemas.microsoft.com/office/drawing/2014/main" id="{0B188E82-C6B7-41B1-9126-48E05395D719}"/>
+              </a:ext>
+            </a:extLst>
+          </p:cNvPr>
+          <p:cNvSpPr txBox="1"/>
+          <p:nvPr/>
+        </p:nvSpPr>
+        <p:spPr>
+          <a:xfrm>
+            <a:off x="10295358" y="2019390"/>
+            <a:ext cx="1333500" cy="430887"/>
+          </a:xfrm>
+          <a:prstGeom prst="rect">
+            <a:avLst/>
+          </a:prstGeom>
+          <a:noFill/>
+        </p:spPr>
+        <p:txBody>
+          <a:bodyPr wrap="square" rtlCol="0">
+            <a:spAutoFit/>
+          </a:bodyPr>
+          <a:lstStyle/>
+          <a:p>
+            <a:pPr algn="r"/>
+            <a:r>
+              <a:rPr lang="fr-FR" sz="1100" dirty="0"/>
+              <a:t>Schéma personnalisé</a:t>
+            </a:r>
+          </a:p>
+        </p:txBody>
+      </p:sp>
+      <p:sp>
+        <p:nvSpPr>
+          <p:cNvPr id="21" name="ZoneTexte 20">
+            <a:extLst>
+              <a:ext uri="{FF2B5EF4-FFF2-40B4-BE49-F238E27FC236}">
+                <a16:creationId xmlns:a16="http://schemas.microsoft.com/office/drawing/2014/main" id="{B73674D9-0F33-4F62-AAF0-71E9D2157F16}"/>
+              </a:ext>
+            </a:extLst>
+          </p:cNvPr>
+          <p:cNvSpPr txBox="1"/>
+          <p:nvPr/>
+        </p:nvSpPr>
+        <p:spPr>
+          <a:xfrm>
+            <a:off x="10237185" y="2754095"/>
+            <a:ext cx="1333500" cy="430887"/>
+          </a:xfrm>
+          <a:prstGeom prst="rect">
+            <a:avLst/>
+          </a:prstGeom>
+          <a:noFill/>
+        </p:spPr>
+        <p:txBody>
+          <a:bodyPr wrap="square" rtlCol="0">
+            <a:spAutoFit/>
+          </a:bodyPr>
+          <a:lstStyle/>
+          <a:p>
+            <a:pPr algn="r"/>
+            <a:r>
+              <a:rPr lang="fr-FR" sz="1100" dirty="0"/>
+              <a:t>Diagramme de cas d’utilisation</a:t>
+            </a:r>
+          </a:p>
+        </p:txBody>
+      </p:sp>
+      <p:sp>
+        <p:nvSpPr>
+          <p:cNvPr id="22" name="ZoneTexte 21">
+            <a:extLst>
+              <a:ext uri="{FF2B5EF4-FFF2-40B4-BE49-F238E27FC236}">
+                <a16:creationId xmlns:a16="http://schemas.microsoft.com/office/drawing/2014/main" id="{DEAD97CF-35B4-47D2-A8F5-6CF8BEA2A11E}"/>
+              </a:ext>
+            </a:extLst>
+          </p:cNvPr>
+          <p:cNvSpPr txBox="1"/>
+          <p:nvPr/>
+        </p:nvSpPr>
+        <p:spPr>
+          <a:xfrm>
+            <a:off x="10053638" y="4383664"/>
+            <a:ext cx="1517047" cy="261610"/>
+          </a:xfrm>
+          <a:prstGeom prst="rect">
+            <a:avLst/>
+          </a:prstGeom>
+          <a:noFill/>
+        </p:spPr>
+        <p:txBody>
+          <a:bodyPr wrap="square" rtlCol="0">
+            <a:spAutoFit/>
+          </a:bodyPr>
+          <a:lstStyle/>
+          <a:p>
+            <a:pPr algn="r"/>
+            <a:r>
+              <a:rPr lang="fr-FR" sz="1100" dirty="0"/>
+              <a:t>Tâches personnelles</a:t>
+            </a:r>
+          </a:p>
+        </p:txBody>
+      </p:sp>
+      <p:sp>
+        <p:nvSpPr>
+          <p:cNvPr id="23" name="ZoneTexte 22">
+            <a:extLst>
+              <a:ext uri="{FF2B5EF4-FFF2-40B4-BE49-F238E27FC236}">
+                <a16:creationId xmlns:a16="http://schemas.microsoft.com/office/drawing/2014/main" id="{71739D9E-A1F1-463A-85C4-42077288343B}"/>
+              </a:ext>
+            </a:extLst>
+          </p:cNvPr>
+          <p:cNvSpPr txBox="1"/>
+          <p:nvPr/>
+        </p:nvSpPr>
+        <p:spPr>
+          <a:xfrm>
+            <a:off x="9953723" y="5916426"/>
+            <a:ext cx="1616962" cy="261610"/>
+          </a:xfrm>
+          <a:prstGeom prst="rect">
+            <a:avLst/>
+          </a:prstGeom>
+          <a:noFill/>
+        </p:spPr>
+        <p:txBody>
+          <a:bodyPr wrap="square" rtlCol="0">
+            <a:spAutoFit/>
+          </a:bodyPr>
+          <a:lstStyle/>
+          <a:p>
+            <a:pPr algn="r"/>
+            <a:r>
+              <a:rPr lang="fr-FR" sz="1100" dirty="0"/>
+              <a:t>Schématisation réseau</a:t>
+            </a:r>
+          </a:p>
+        </p:txBody>
+      </p:sp>
+      <p:sp>
+        <p:nvSpPr>
+          <p:cNvPr id="24" name="Rectangle 23">
+            <a:extLst>
+              <a:ext uri="{FF2B5EF4-FFF2-40B4-BE49-F238E27FC236}">
+                <a16:creationId xmlns:a16="http://schemas.microsoft.com/office/drawing/2014/main" id="{C08116EC-1234-49A5-8D9C-4AF2CACB360A}"/>
               </a:ext>
             </a:extLst>
           </p:cNvPr>
@@ -8526,14 +8828,14 @@
         </p:nvSpPr>
         <p:spPr>
           <a:xfrm>
-            <a:off x="11562541" y="1448372"/>
-            <a:ext cx="188499" cy="71437"/>
-          </a:xfrm>
-          <a:prstGeom prst="flowChartTerminator">
+            <a:off x="11695175" y="627394"/>
+            <a:ext cx="64009" cy="892415"/>
+          </a:xfrm>
+          <a:prstGeom prst="rect">
             <a:avLst/>
           </a:prstGeom>
           <a:solidFill>
-            <a:srgbClr val="009900"/>
+            <a:srgbClr val="A31257"/>
           </a:solidFill>
           <a:ln>
             <a:noFill/>
@@ -8566,10 +8868,10 @@
       </p:sp>
       <p:sp>
         <p:nvSpPr>
-          <p:cNvPr id="17" name="Organigramme : Terminateur 16">
+          <p:cNvPr id="9" name="Ellipse 8">
             <a:extLst>
               <a:ext uri="{FF2B5EF4-FFF2-40B4-BE49-F238E27FC236}">
-                <a16:creationId xmlns:a16="http://schemas.microsoft.com/office/drawing/2014/main" id="{72E41086-A62D-4CF5-B7DB-B0A89BC049A2}"/>
+                <a16:creationId xmlns:a16="http://schemas.microsoft.com/office/drawing/2014/main" id="{CE87EE90-A0D4-4C9A-8C57-2C006C6BB615}"/>
               </a:ext>
             </a:extLst>
           </p:cNvPr>
@@ -8578,17 +8880,19 @@
         </p:nvSpPr>
         <p:spPr>
           <a:xfrm>
-            <a:off x="11570685" y="2179226"/>
-            <a:ext cx="188499" cy="71437"/>
-          </a:xfrm>
-          <a:prstGeom prst="flowChartTerminator">
+            <a:off x="11530584" y="570246"/>
+            <a:ext cx="400813" cy="366747"/>
+          </a:xfrm>
+          <a:prstGeom prst="ellipse">
             <a:avLst/>
           </a:prstGeom>
           <a:solidFill>
-            <a:schemeClr val="bg1"/>
+            <a:srgbClr val="A31257"/>
           </a:solidFill>
           <a:ln>
-            <a:noFill/>
+            <a:solidFill>
+              <a:schemeClr val="bg1"/>
+            </a:solidFill>
           </a:ln>
         </p:spPr>
         <p:style>
@@ -8616,282 +8920,6 @@
           </a:p>
         </p:txBody>
       </p:sp>
-      <p:sp>
-        <p:nvSpPr>
-          <p:cNvPr id="16" name="ZoneTexte 15">
-            <a:extLst>
-              <a:ext uri="{FF2B5EF4-FFF2-40B4-BE49-F238E27FC236}">
-                <a16:creationId xmlns:a16="http://schemas.microsoft.com/office/drawing/2014/main" id="{F7857BB6-E342-4747-9425-F3E9DD2ADBD3}"/>
-              </a:ext>
-            </a:extLst>
-          </p:cNvPr>
-          <p:cNvSpPr txBox="1"/>
-          <p:nvPr/>
-        </p:nvSpPr>
-        <p:spPr>
-          <a:xfrm>
-            <a:off x="10197081" y="537591"/>
-            <a:ext cx="1333500" cy="430887"/>
-          </a:xfrm>
-          <a:prstGeom prst="rect">
-            <a:avLst/>
-          </a:prstGeom>
-          <a:noFill/>
-        </p:spPr>
-        <p:txBody>
-          <a:bodyPr wrap="square" rtlCol="0">
-            <a:spAutoFit/>
-          </a:bodyPr>
-          <a:lstStyle/>
-          <a:p>
-            <a:pPr algn="r"/>
-            <a:r>
-              <a:rPr lang="fr-FR" sz="1100" dirty="0">
-                <a:solidFill>
-                  <a:srgbClr val="A41258"/>
-                </a:solidFill>
-              </a:rPr>
-              <a:t>Présentation du projet</a:t>
-            </a:r>
-          </a:p>
-        </p:txBody>
-      </p:sp>
-      <p:sp>
-        <p:nvSpPr>
-          <p:cNvPr id="19" name="ZoneTexte 18">
-            <a:extLst>
-              <a:ext uri="{FF2B5EF4-FFF2-40B4-BE49-F238E27FC236}">
-                <a16:creationId xmlns:a16="http://schemas.microsoft.com/office/drawing/2014/main" id="{C6736818-D057-4050-AB8A-3E2BF2159972}"/>
-              </a:ext>
-            </a:extLst>
-          </p:cNvPr>
-          <p:cNvSpPr txBox="1"/>
-          <p:nvPr/>
-        </p:nvSpPr>
-        <p:spPr>
-          <a:xfrm>
-            <a:off x="10295358" y="1353285"/>
-            <a:ext cx="1333500" cy="261610"/>
-          </a:xfrm>
-          <a:prstGeom prst="rect">
-            <a:avLst/>
-          </a:prstGeom>
-          <a:noFill/>
-        </p:spPr>
-        <p:txBody>
-          <a:bodyPr wrap="square" rtlCol="0">
-            <a:spAutoFit/>
-          </a:bodyPr>
-          <a:lstStyle/>
-          <a:p>
-            <a:pPr algn="r"/>
-            <a:r>
-              <a:rPr lang="fr-FR" sz="1100" dirty="0">
-                <a:solidFill>
-                  <a:srgbClr val="A41258"/>
-                </a:solidFill>
-              </a:rPr>
-              <a:t>Schéma global</a:t>
-            </a:r>
-          </a:p>
-        </p:txBody>
-      </p:sp>
-      <p:sp>
-        <p:nvSpPr>
-          <p:cNvPr id="20" name="ZoneTexte 19">
-            <a:extLst>
-              <a:ext uri="{FF2B5EF4-FFF2-40B4-BE49-F238E27FC236}">
-                <a16:creationId xmlns:a16="http://schemas.microsoft.com/office/drawing/2014/main" id="{0B188E82-C6B7-41B1-9126-48E05395D719}"/>
-              </a:ext>
-            </a:extLst>
-          </p:cNvPr>
-          <p:cNvSpPr txBox="1"/>
-          <p:nvPr/>
-        </p:nvSpPr>
-        <p:spPr>
-          <a:xfrm>
-            <a:off x="10295358" y="2019390"/>
-            <a:ext cx="1333500" cy="430887"/>
-          </a:xfrm>
-          <a:prstGeom prst="rect">
-            <a:avLst/>
-          </a:prstGeom>
-          <a:noFill/>
-        </p:spPr>
-        <p:txBody>
-          <a:bodyPr wrap="square" rtlCol="0">
-            <a:spAutoFit/>
-          </a:bodyPr>
-          <a:lstStyle/>
-          <a:p>
-            <a:pPr algn="r"/>
-            <a:r>
-              <a:rPr lang="fr-FR" sz="1100" dirty="0"/>
-              <a:t>Schéma personnalisé</a:t>
-            </a:r>
-          </a:p>
-        </p:txBody>
-      </p:sp>
-      <p:sp>
-        <p:nvSpPr>
-          <p:cNvPr id="21" name="ZoneTexte 20">
-            <a:extLst>
-              <a:ext uri="{FF2B5EF4-FFF2-40B4-BE49-F238E27FC236}">
-                <a16:creationId xmlns:a16="http://schemas.microsoft.com/office/drawing/2014/main" id="{B73674D9-0F33-4F62-AAF0-71E9D2157F16}"/>
-              </a:ext>
-            </a:extLst>
-          </p:cNvPr>
-          <p:cNvSpPr txBox="1"/>
-          <p:nvPr/>
-        </p:nvSpPr>
-        <p:spPr>
-          <a:xfrm>
-            <a:off x="10237185" y="2754095"/>
-            <a:ext cx="1333500" cy="430887"/>
-          </a:xfrm>
-          <a:prstGeom prst="rect">
-            <a:avLst/>
-          </a:prstGeom>
-          <a:noFill/>
-        </p:spPr>
-        <p:txBody>
-          <a:bodyPr wrap="square" rtlCol="0">
-            <a:spAutoFit/>
-          </a:bodyPr>
-          <a:lstStyle/>
-          <a:p>
-            <a:pPr algn="r"/>
-            <a:r>
-              <a:rPr lang="fr-FR" sz="1100" dirty="0"/>
-              <a:t>Diagramme de cas d’utilisation</a:t>
-            </a:r>
-          </a:p>
-        </p:txBody>
-      </p:sp>
-      <p:sp>
-        <p:nvSpPr>
-          <p:cNvPr id="22" name="ZoneTexte 21">
-            <a:extLst>
-              <a:ext uri="{FF2B5EF4-FFF2-40B4-BE49-F238E27FC236}">
-                <a16:creationId xmlns:a16="http://schemas.microsoft.com/office/drawing/2014/main" id="{DEAD97CF-35B4-47D2-A8F5-6CF8BEA2A11E}"/>
-              </a:ext>
-            </a:extLst>
-          </p:cNvPr>
-          <p:cNvSpPr txBox="1"/>
-          <p:nvPr/>
-        </p:nvSpPr>
-        <p:spPr>
-          <a:xfrm>
-            <a:off x="10053638" y="4383664"/>
-            <a:ext cx="1517047" cy="261610"/>
-          </a:xfrm>
-          <a:prstGeom prst="rect">
-            <a:avLst/>
-          </a:prstGeom>
-          <a:noFill/>
-        </p:spPr>
-        <p:txBody>
-          <a:bodyPr wrap="square" rtlCol="0">
-            <a:spAutoFit/>
-          </a:bodyPr>
-          <a:lstStyle/>
-          <a:p>
-            <a:pPr algn="r"/>
-            <a:r>
-              <a:rPr lang="fr-FR" sz="1100" dirty="0"/>
-              <a:t>Tâches personnelles</a:t>
-            </a:r>
-          </a:p>
-        </p:txBody>
-      </p:sp>
-      <p:sp>
-        <p:nvSpPr>
-          <p:cNvPr id="23" name="ZoneTexte 22">
-            <a:extLst>
-              <a:ext uri="{FF2B5EF4-FFF2-40B4-BE49-F238E27FC236}">
-                <a16:creationId xmlns:a16="http://schemas.microsoft.com/office/drawing/2014/main" id="{71739D9E-A1F1-463A-85C4-42077288343B}"/>
-              </a:ext>
-            </a:extLst>
-          </p:cNvPr>
-          <p:cNvSpPr txBox="1"/>
-          <p:nvPr/>
-        </p:nvSpPr>
-        <p:spPr>
-          <a:xfrm>
-            <a:off x="9953723" y="5916426"/>
-            <a:ext cx="1616962" cy="261610"/>
-          </a:xfrm>
-          <a:prstGeom prst="rect">
-            <a:avLst/>
-          </a:prstGeom>
-          <a:noFill/>
-        </p:spPr>
-        <p:txBody>
-          <a:bodyPr wrap="square" rtlCol="0">
-            <a:spAutoFit/>
-          </a:bodyPr>
-          <a:lstStyle/>
-          <a:p>
-            <a:pPr algn="r"/>
-            <a:r>
-              <a:rPr lang="fr-FR" sz="1100" dirty="0"/>
-              <a:t>Schématisation réseau</a:t>
-            </a:r>
-          </a:p>
-        </p:txBody>
-      </p:sp>
-      <p:sp>
-        <p:nvSpPr>
-          <p:cNvPr id="24" name="Rectangle 23">
-            <a:extLst>
-              <a:ext uri="{FF2B5EF4-FFF2-40B4-BE49-F238E27FC236}">
-                <a16:creationId xmlns:a16="http://schemas.microsoft.com/office/drawing/2014/main" id="{C08116EC-1234-49A5-8D9C-4AF2CACB360A}"/>
-              </a:ext>
-            </a:extLst>
-          </p:cNvPr>
-          <p:cNvSpPr/>
-          <p:nvPr/>
-        </p:nvSpPr>
-        <p:spPr>
-          <a:xfrm>
-            <a:off x="11695175" y="627394"/>
-            <a:ext cx="64009" cy="892415"/>
-          </a:xfrm>
-          <a:prstGeom prst="rect">
-            <a:avLst/>
-          </a:prstGeom>
-          <a:solidFill>
-            <a:srgbClr val="009900"/>
-          </a:solidFill>
-          <a:ln>
-            <a:noFill/>
-          </a:ln>
-        </p:spPr>
-        <p:style>
-          <a:lnRef idx="2">
-            <a:schemeClr val="accent1">
-              <a:shade val="50000"/>
-            </a:schemeClr>
-          </a:lnRef>
-          <a:fillRef idx="1">
-            <a:schemeClr val="accent1"/>
-          </a:fillRef>
-          <a:effectRef idx="0">
-            <a:schemeClr val="accent1"/>
-          </a:effectRef>
-          <a:fontRef idx="minor">
-            <a:schemeClr val="lt1"/>
-          </a:fontRef>
-        </p:style>
-        <p:txBody>
-          <a:bodyPr rtlCol="0" anchor="ctr"/>
-          <a:lstStyle/>
-          <a:p>
-            <a:pPr algn="ctr"/>
-            <a:endParaRPr lang="fr-FR"/>
-          </a:p>
-        </p:txBody>
-      </p:sp>
     </p:spTree>
     <p:extLst>
       <p:ext uri="{BB962C8B-B14F-4D97-AF65-F5344CB8AC3E}">
@@ -8902,13 +8930,13 @@
   <p:clrMapOvr>
     <a:masterClrMapping/>
   </p:clrMapOvr>
-  <mc:AlternateContent xmlns:mc="http://schemas.openxmlformats.org/markup-compatibility/2006">
-    <mc:Choice xmlns:p14="http://schemas.microsoft.com/office/powerpoint/2010/main" Requires="p14">
+  <mc:AlternateContent xmlns:mc="http://schemas.openxmlformats.org/markup-compatibility/2006" xmlns:p14="http://schemas.microsoft.com/office/powerpoint/2010/main">
+    <mc:Choice Requires="p14">
       <p:transition spd="med" p14:dur="700">
         <p:fade/>
       </p:transition>
     </mc:Choice>
-    <mc:Fallback>
+    <mc:Fallback xmlns="">
       <p:transition spd="med">
         <p:fade/>
       </p:transition>
@@ -9365,7 +9393,9 @@
             <a:schemeClr val="bg1"/>
           </a:solidFill>
           <a:ln>
-            <a:noFill/>
+            <a:solidFill>
+              <a:schemeClr val="bg1"/>
+            </a:solidFill>
           </a:ln>
         </p:spPr>
         <p:style>
@@ -9414,10 +9444,12 @@
             <a:avLst/>
           </a:prstGeom>
           <a:solidFill>
-            <a:srgbClr val="009900"/>
+            <a:srgbClr val="A31257"/>
           </a:solidFill>
           <a:ln>
-            <a:noFill/>
+            <a:solidFill>
+              <a:schemeClr val="bg1"/>
+            </a:solidFill>
           </a:ln>
         </p:spPr>
         <p:style>
@@ -9469,7 +9501,9 @@
             <a:schemeClr val="bg1"/>
           </a:solidFill>
           <a:ln>
-            <a:noFill/>
+            <a:solidFill>
+              <a:schemeClr val="bg1"/>
+            </a:solidFill>
           </a:ln>
         </p:spPr>
         <p:style>
@@ -9521,7 +9555,9 @@
             <a:schemeClr val="bg1"/>
           </a:solidFill>
           <a:ln>
-            <a:noFill/>
+            <a:solidFill>
+              <a:schemeClr val="bg1"/>
+            </a:solidFill>
           </a:ln>
         </p:spPr>
         <p:style>
@@ -9573,7 +9609,9 @@
             <a:schemeClr val="bg1"/>
           </a:solidFill>
           <a:ln>
-            <a:noFill/>
+            <a:solidFill>
+              <a:schemeClr val="bg1"/>
+            </a:solidFill>
           </a:ln>
         </p:spPr>
         <p:style>
@@ -9622,10 +9660,12 @@
             <a:avLst/>
           </a:prstGeom>
           <a:solidFill>
-            <a:srgbClr val="009900"/>
+            <a:srgbClr val="A31257"/>
           </a:solidFill>
           <a:ln>
-            <a:noFill/>
+            <a:solidFill>
+              <a:schemeClr val="bg1"/>
+            </a:solidFill>
           </a:ln>
         </p:spPr>
         <p:style>
@@ -9674,10 +9714,12 @@
             <a:avLst/>
           </a:prstGeom>
           <a:solidFill>
-            <a:srgbClr val="009900"/>
+            <a:srgbClr val="A31257"/>
           </a:solidFill>
           <a:ln>
-            <a:noFill/>
+            <a:solidFill>
+              <a:schemeClr val="bg1"/>
+            </a:solidFill>
           </a:ln>
         </p:spPr>
         <p:style>
@@ -9950,7 +9992,7 @@
             <a:avLst/>
           </a:prstGeom>
           <a:solidFill>
-            <a:srgbClr val="009900"/>
+            <a:srgbClr val="A31257"/>
           </a:solidFill>
           <a:ln>
             <a:noFill/>
@@ -10246,7 +10288,9 @@
             <a:schemeClr val="bg1"/>
           </a:solidFill>
           <a:ln>
-            <a:noFill/>
+            <a:solidFill>
+              <a:schemeClr val="bg1"/>
+            </a:solidFill>
           </a:ln>
         </p:spPr>
         <p:style>
@@ -10295,10 +10339,12 @@
             <a:avLst/>
           </a:prstGeom>
           <a:solidFill>
-            <a:srgbClr val="009900"/>
+            <a:srgbClr val="A31257"/>
           </a:solidFill>
           <a:ln>
-            <a:noFill/>
+            <a:solidFill>
+              <a:schemeClr val="bg1"/>
+            </a:solidFill>
           </a:ln>
         </p:spPr>
         <p:style>
@@ -10347,10 +10393,12 @@
             <a:avLst/>
           </a:prstGeom>
           <a:solidFill>
-            <a:srgbClr val="009900"/>
+            <a:srgbClr val="A31257"/>
           </a:solidFill>
           <a:ln>
-            <a:noFill/>
+            <a:solidFill>
+              <a:schemeClr val="bg1"/>
+            </a:solidFill>
           </a:ln>
         </p:spPr>
         <p:style>
@@ -10402,7 +10450,9 @@
             <a:schemeClr val="bg1"/>
           </a:solidFill>
           <a:ln>
-            <a:noFill/>
+            <a:solidFill>
+              <a:schemeClr val="bg1"/>
+            </a:solidFill>
           </a:ln>
         </p:spPr>
         <p:style>
@@ -10454,7 +10504,9 @@
             <a:schemeClr val="bg1"/>
           </a:solidFill>
           <a:ln>
-            <a:noFill/>
+            <a:solidFill>
+              <a:schemeClr val="bg1"/>
+            </a:solidFill>
           </a:ln>
         </p:spPr>
         <p:style>
@@ -10503,10 +10555,12 @@
             <a:avLst/>
           </a:prstGeom>
           <a:solidFill>
-            <a:srgbClr val="009900"/>
+            <a:srgbClr val="A31257"/>
           </a:solidFill>
           <a:ln>
-            <a:noFill/>
+            <a:solidFill>
+              <a:schemeClr val="bg1"/>
+            </a:solidFill>
           </a:ln>
         </p:spPr>
         <p:style>
@@ -10555,10 +10609,12 @@
             <a:avLst/>
           </a:prstGeom>
           <a:solidFill>
-            <a:srgbClr val="009900"/>
+            <a:srgbClr val="A31257"/>
           </a:solidFill>
           <a:ln>
-            <a:noFill/>
+            <a:solidFill>
+              <a:schemeClr val="bg1"/>
+            </a:solidFill>
           </a:ln>
         </p:spPr>
         <p:style>
@@ -10827,7 +10883,7 @@
             <a:avLst/>
           </a:prstGeom>
           <a:solidFill>
-            <a:srgbClr val="009900"/>
+            <a:srgbClr val="A31257"/>
           </a:solidFill>
           <a:ln>
             <a:noFill/>
@@ -11593,8 +11649,8 @@
         </p:nvCxnSpPr>
         <p:spPr>
           <a:xfrm flipV="1">
-            <a:off x="3344249" y="3182475"/>
-            <a:ext cx="1638000" cy="405156"/>
+            <a:off x="3344249" y="3165081"/>
+            <a:ext cx="1721527" cy="422550"/>
           </a:xfrm>
           <a:prstGeom prst="straightConnector1">
             <a:avLst/>
@@ -12045,7 +12101,9 @@
             <a:schemeClr val="bg1"/>
           </a:solidFill>
           <a:ln>
-            <a:noFill/>
+            <a:solidFill>
+              <a:schemeClr val="bg1"/>
+            </a:solidFill>
           </a:ln>
         </p:spPr>
         <p:style>
@@ -12094,10 +12152,12 @@
             <a:avLst/>
           </a:prstGeom>
           <a:solidFill>
-            <a:srgbClr val="009900"/>
+            <a:srgbClr val="A31257"/>
           </a:solidFill>
           <a:ln>
-            <a:noFill/>
+            <a:solidFill>
+              <a:schemeClr val="bg1"/>
+            </a:solidFill>
           </a:ln>
         </p:spPr>
         <p:style>
@@ -12146,10 +12206,12 @@
             <a:avLst/>
           </a:prstGeom>
           <a:solidFill>
-            <a:srgbClr val="009900"/>
+            <a:srgbClr val="A31257"/>
           </a:solidFill>
           <a:ln>
-            <a:noFill/>
+            <a:solidFill>
+              <a:schemeClr val="bg1"/>
+            </a:solidFill>
           </a:ln>
         </p:spPr>
         <p:style>
@@ -12198,10 +12260,12 @@
             <a:avLst/>
           </a:prstGeom>
           <a:solidFill>
-            <a:srgbClr val="009900"/>
+            <a:srgbClr val="A31257"/>
           </a:solidFill>
           <a:ln>
-            <a:noFill/>
+            <a:solidFill>
+              <a:schemeClr val="bg1"/>
+            </a:solidFill>
           </a:ln>
         </p:spPr>
         <p:style>
@@ -12253,7 +12317,9 @@
             <a:schemeClr val="bg1"/>
           </a:solidFill>
           <a:ln>
-            <a:noFill/>
+            <a:solidFill>
+              <a:schemeClr val="bg1"/>
+            </a:solidFill>
           </a:ln>
         </p:spPr>
         <p:style>
@@ -12302,10 +12368,12 @@
             <a:avLst/>
           </a:prstGeom>
           <a:solidFill>
-            <a:srgbClr val="009900"/>
+            <a:srgbClr val="A31257"/>
           </a:solidFill>
           <a:ln>
-            <a:noFill/>
+            <a:solidFill>
+              <a:schemeClr val="bg1"/>
+            </a:solidFill>
           </a:ln>
         </p:spPr>
         <p:style>
@@ -12354,10 +12422,12 @@
             <a:avLst/>
           </a:prstGeom>
           <a:solidFill>
-            <a:srgbClr val="009900"/>
+            <a:srgbClr val="A31257"/>
           </a:solidFill>
           <a:ln>
-            <a:noFill/>
+            <a:solidFill>
+              <a:schemeClr val="bg1"/>
+            </a:solidFill>
           </a:ln>
         </p:spPr>
         <p:style>
@@ -12626,7 +12696,7 @@
             <a:avLst/>
           </a:prstGeom>
           <a:solidFill>
-            <a:srgbClr val="009900"/>
+            <a:srgbClr val="A31257"/>
           </a:solidFill>
           <a:ln>
             <a:noFill/>
@@ -12919,7 +12989,9 @@
             <a:schemeClr val="bg1"/>
           </a:solidFill>
           <a:ln>
-            <a:noFill/>
+            <a:solidFill>
+              <a:schemeClr val="bg1"/>
+            </a:solidFill>
           </a:ln>
         </p:spPr>
         <p:style>
@@ -12968,10 +13040,12 @@
             <a:avLst/>
           </a:prstGeom>
           <a:solidFill>
-            <a:srgbClr val="009900"/>
+            <a:srgbClr val="A31257"/>
           </a:solidFill>
           <a:ln>
-            <a:noFill/>
+            <a:solidFill>
+              <a:schemeClr val="bg1"/>
+            </a:solidFill>
           </a:ln>
         </p:spPr>
         <p:style>
@@ -13020,10 +13094,12 @@
             <a:avLst/>
           </a:prstGeom>
           <a:solidFill>
-            <a:srgbClr val="009900"/>
+            <a:srgbClr val="A31257"/>
           </a:solidFill>
           <a:ln>
-            <a:noFill/>
+            <a:solidFill>
+              <a:schemeClr val="bg1"/>
+            </a:solidFill>
           </a:ln>
         </p:spPr>
         <p:style>
@@ -13072,10 +13148,12 @@
             <a:avLst/>
           </a:prstGeom>
           <a:solidFill>
-            <a:srgbClr val="009900"/>
+            <a:srgbClr val="A31257"/>
           </a:solidFill>
           <a:ln>
-            <a:noFill/>
+            <a:solidFill>
+              <a:schemeClr val="bg1"/>
+            </a:solidFill>
           </a:ln>
         </p:spPr>
         <p:style>
@@ -13124,10 +13202,12 @@
             <a:avLst/>
           </a:prstGeom>
           <a:solidFill>
-            <a:srgbClr val="009900"/>
+            <a:srgbClr val="A31257"/>
           </a:solidFill>
           <a:ln>
-            <a:noFill/>
+            <a:solidFill>
+              <a:schemeClr val="bg1"/>
+            </a:solidFill>
           </a:ln>
         </p:spPr>
         <p:style>
@@ -13176,10 +13256,12 @@
             <a:avLst/>
           </a:prstGeom>
           <a:solidFill>
-            <a:srgbClr val="009900"/>
+            <a:srgbClr val="A31257"/>
           </a:solidFill>
           <a:ln>
-            <a:noFill/>
+            <a:solidFill>
+              <a:schemeClr val="bg1"/>
+            </a:solidFill>
           </a:ln>
         </p:spPr>
         <p:style>
@@ -13228,10 +13310,12 @@
             <a:avLst/>
           </a:prstGeom>
           <a:solidFill>
-            <a:srgbClr val="009900"/>
+            <a:srgbClr val="A31257"/>
           </a:solidFill>
           <a:ln>
-            <a:noFill/>
+            <a:solidFill>
+              <a:schemeClr val="bg1"/>
+            </a:solidFill>
           </a:ln>
         </p:spPr>
         <p:style>
@@ -13500,7 +13584,7 @@
             <a:avLst/>
           </a:prstGeom>
           <a:solidFill>
-            <a:srgbClr val="009900"/>
+            <a:srgbClr val="A31257"/>
           </a:solidFill>
           <a:ln>
             <a:noFill/>

</xml_diff>

<commit_message>
Création d'un effet sur le logo du téléthon
</commit_message>
<xml_diff>
--- a/Nathan/Compte-rendus/REVUE-R1-GUIGAND-SFL6.pptx
+++ b/Nathan/Compte-rendus/REVUE-R1-GUIGAND-SFL6.pptx
@@ -6974,13 +6974,13 @@
               </a:ext>
             </a:extLst>
           </a:blip>
-          <a:srcRect l="18677" r="15441"/>
+          <a:srcRect l="18677" r="31483"/>
           <a:stretch/>
         </p:blipFill>
         <p:spPr bwMode="auto">
           <a:xfrm>
             <a:off x="569173" y="2255689"/>
-            <a:ext cx="4130844" cy="1109501"/>
+            <a:ext cx="3125003" cy="1109501"/>
           </a:xfrm>
           <a:prstGeom prst="rect">
             <a:avLst/>
@@ -7221,6 +7221,304 @@
           </a:p>
         </p:txBody>
       </p:sp>
+      <p:pic>
+        <p:nvPicPr>
+          <p:cNvPr id="22" name="Image 21">
+            <a:extLst>
+              <a:ext uri="{FF2B5EF4-FFF2-40B4-BE49-F238E27FC236}">
+                <a16:creationId xmlns:a16="http://schemas.microsoft.com/office/drawing/2014/main" id="{AD2868D5-1AC2-4159-BA04-DCF98EFEA321}"/>
+              </a:ext>
+            </a:extLst>
+          </p:cNvPr>
+          <p:cNvPicPr>
+            <a:picLocks noChangeAspect="1"/>
+          </p:cNvPicPr>
+          <p:nvPr/>
+        </p:nvPicPr>
+        <p:blipFill rotWithShape="1">
+          <a:blip r:embed="rId4">
+            <a:extLst>
+              <a:ext uri="{28A0092B-C50C-407E-A947-70E740481C1C}">
+                <a14:useLocalDpi xmlns:a14="http://schemas.microsoft.com/office/drawing/2010/main" val="0"/>
+              </a:ext>
+            </a:extLst>
+          </a:blip>
+          <a:srcRect l="20640" t="31216" r="34055" b="28466"/>
+          <a:stretch/>
+        </p:blipFill>
+        <p:spPr>
+          <a:xfrm>
+            <a:off x="3805604" y="2647523"/>
+            <a:ext cx="786268" cy="717667"/>
+          </a:xfrm>
+          <a:prstGeom prst="rect">
+            <a:avLst/>
+          </a:prstGeom>
+          <a:effectLst/>
+        </p:spPr>
+      </p:pic>
+      <p:pic>
+        <p:nvPicPr>
+          <p:cNvPr id="23" name="Image 22">
+            <a:extLst>
+              <a:ext uri="{FF2B5EF4-FFF2-40B4-BE49-F238E27FC236}">
+                <a16:creationId xmlns:a16="http://schemas.microsoft.com/office/drawing/2014/main" id="{D4CEBD47-F952-46F5-B2DB-1F2B06DD1048}"/>
+              </a:ext>
+            </a:extLst>
+          </p:cNvPr>
+          <p:cNvPicPr>
+            <a:picLocks noChangeAspect="1"/>
+          </p:cNvPicPr>
+          <p:nvPr/>
+        </p:nvPicPr>
+        <p:blipFill rotWithShape="1">
+          <a:blip r:embed="rId4">
+            <a:extLst>
+              <a:ext uri="{28A0092B-C50C-407E-A947-70E740481C1C}">
+                <a14:useLocalDpi xmlns:a14="http://schemas.microsoft.com/office/drawing/2010/main" val="0"/>
+              </a:ext>
+            </a:extLst>
+          </a:blip>
+          <a:srcRect l="43383" t="6720" r="34561" b="68241"/>
+          <a:stretch/>
+        </p:blipFill>
+        <p:spPr>
+          <a:xfrm>
+            <a:off x="4210829" y="2233594"/>
+            <a:ext cx="382781" cy="445693"/>
+          </a:xfrm>
+          <a:prstGeom prst="rect">
+            <a:avLst/>
+          </a:prstGeom>
+          <a:effectLst>
+            <a:outerShdw blurRad="63500" sx="102000" sy="102000" algn="ctr" rotWithShape="0">
+              <a:prstClr val="black">
+                <a:alpha val="40000"/>
+              </a:prstClr>
+            </a:outerShdw>
+          </a:effectLst>
+        </p:spPr>
+      </p:pic>
+      <p:pic>
+        <p:nvPicPr>
+          <p:cNvPr id="24" name="Image 23">
+            <a:extLst>
+              <a:ext uri="{FF2B5EF4-FFF2-40B4-BE49-F238E27FC236}">
+                <a16:creationId xmlns:a16="http://schemas.microsoft.com/office/drawing/2014/main" id="{DE0DDA38-094E-4797-BFF3-6F6099FE5BCD}"/>
+              </a:ext>
+            </a:extLst>
+          </p:cNvPr>
+          <p:cNvPicPr>
+            <a:picLocks noChangeAspect="1"/>
+          </p:cNvPicPr>
+          <p:nvPr/>
+        </p:nvPicPr>
+        <p:blipFill rotWithShape="1">
+          <a:blip r:embed="rId4">
+            <a:extLst>
+              <a:ext uri="{28A0092B-C50C-407E-A947-70E740481C1C}">
+                <a14:useLocalDpi xmlns:a14="http://schemas.microsoft.com/office/drawing/2010/main" val="0"/>
+              </a:ext>
+            </a:extLst>
+          </a:blip>
+          <a:srcRect t="71007" r="66714"/>
+          <a:stretch/>
+        </p:blipFill>
+        <p:spPr>
+          <a:xfrm>
+            <a:off x="3449337" y="3355673"/>
+            <a:ext cx="577677" cy="516076"/>
+          </a:xfrm>
+          <a:prstGeom prst="rect">
+            <a:avLst/>
+          </a:prstGeom>
+          <a:effectLst>
+            <a:outerShdw blurRad="63500" sx="102000" sy="102000" algn="ctr" rotWithShape="0">
+              <a:prstClr val="black">
+                <a:alpha val="40000"/>
+              </a:prstClr>
+            </a:outerShdw>
+          </a:effectLst>
+        </p:spPr>
+      </p:pic>
+      <p:sp>
+        <p:nvSpPr>
+          <p:cNvPr id="25" name="Rectangle 24">
+            <a:extLst>
+              <a:ext uri="{FF2B5EF4-FFF2-40B4-BE49-F238E27FC236}">
+                <a16:creationId xmlns:a16="http://schemas.microsoft.com/office/drawing/2014/main" id="{5E8649C1-22FB-4FFB-8AF4-68C6BC767A45}"/>
+              </a:ext>
+            </a:extLst>
+          </p:cNvPr>
+          <p:cNvSpPr/>
+          <p:nvPr/>
+        </p:nvSpPr>
+        <p:spPr>
+          <a:xfrm>
+            <a:off x="3633177" y="2562598"/>
+            <a:ext cx="448576" cy="198668"/>
+          </a:xfrm>
+          <a:prstGeom prst="rect">
+            <a:avLst/>
+          </a:prstGeom>
+          <a:solidFill>
+            <a:schemeClr val="bg1"/>
+          </a:solidFill>
+          <a:ln>
+            <a:noFill/>
+          </a:ln>
+        </p:spPr>
+        <p:style>
+          <a:lnRef idx="2">
+            <a:schemeClr val="accent1">
+              <a:shade val="50000"/>
+            </a:schemeClr>
+          </a:lnRef>
+          <a:fillRef idx="1">
+            <a:schemeClr val="accent1"/>
+          </a:fillRef>
+          <a:effectRef idx="0">
+            <a:schemeClr val="accent1"/>
+          </a:effectRef>
+          <a:fontRef idx="minor">
+            <a:schemeClr val="lt1"/>
+          </a:fontRef>
+        </p:style>
+        <p:txBody>
+          <a:bodyPr rtlCol="0" anchor="ctr"/>
+          <a:lstStyle/>
+          <a:p>
+            <a:pPr algn="ctr"/>
+            <a:endParaRPr lang="fr-FR"/>
+          </a:p>
+        </p:txBody>
+      </p:sp>
+      <p:pic>
+        <p:nvPicPr>
+          <p:cNvPr id="26" name="Image 25">
+            <a:extLst>
+              <a:ext uri="{FF2B5EF4-FFF2-40B4-BE49-F238E27FC236}">
+                <a16:creationId xmlns:a16="http://schemas.microsoft.com/office/drawing/2014/main" id="{4B1E3971-9CB1-4405-BE52-882B5D29BFEE}"/>
+              </a:ext>
+            </a:extLst>
+          </p:cNvPr>
+          <p:cNvPicPr>
+            <a:picLocks noChangeAspect="1"/>
+          </p:cNvPicPr>
+          <p:nvPr/>
+        </p:nvPicPr>
+        <p:blipFill rotWithShape="1">
+          <a:blip r:embed="rId4">
+            <a:extLst>
+              <a:ext uri="{28A0092B-C50C-407E-A947-70E740481C1C}">
+                <a14:useLocalDpi xmlns:a14="http://schemas.microsoft.com/office/drawing/2010/main" val="0"/>
+              </a:ext>
+            </a:extLst>
+          </a:blip>
+          <a:srcRect r="68347" b="63322"/>
+          <a:stretch/>
+        </p:blipFill>
+        <p:spPr>
+          <a:xfrm>
+            <a:off x="3490218" y="2069291"/>
+            <a:ext cx="549335" cy="652882"/>
+          </a:xfrm>
+          <a:prstGeom prst="rect">
+            <a:avLst/>
+          </a:prstGeom>
+          <a:effectLst>
+            <a:outerShdw blurRad="63500" sx="102000" sy="102000" algn="ctr" rotWithShape="0">
+              <a:prstClr val="black">
+                <a:alpha val="40000"/>
+              </a:prstClr>
+            </a:outerShdw>
+          </a:effectLst>
+        </p:spPr>
+      </p:pic>
+      <p:pic>
+        <p:nvPicPr>
+          <p:cNvPr id="27" name="Image 26">
+            <a:extLst>
+              <a:ext uri="{FF2B5EF4-FFF2-40B4-BE49-F238E27FC236}">
+                <a16:creationId xmlns:a16="http://schemas.microsoft.com/office/drawing/2014/main" id="{747C7E8E-9ABD-45AF-9A37-D6FD26A618D7}"/>
+              </a:ext>
+            </a:extLst>
+          </p:cNvPr>
+          <p:cNvPicPr>
+            <a:picLocks noChangeAspect="1"/>
+          </p:cNvPicPr>
+          <p:nvPr/>
+        </p:nvPicPr>
+        <p:blipFill rotWithShape="1">
+          <a:blip r:embed="rId4">
+            <a:extLst>
+              <a:ext uri="{28A0092B-C50C-407E-A947-70E740481C1C}">
+                <a14:useLocalDpi xmlns:a14="http://schemas.microsoft.com/office/drawing/2010/main" val="0"/>
+              </a:ext>
+            </a:extLst>
+          </a:blip>
+          <a:srcRect l="48950" t="71007" r="29109"/>
+          <a:stretch/>
+        </p:blipFill>
+        <p:spPr>
+          <a:xfrm>
+            <a:off x="4337982" y="3365190"/>
+            <a:ext cx="380786" cy="516075"/>
+          </a:xfrm>
+          <a:prstGeom prst="rect">
+            <a:avLst/>
+          </a:prstGeom>
+          <a:effectLst>
+            <a:outerShdw blurRad="63500" sx="102000" sy="102000" algn="ctr" rotWithShape="0">
+              <a:prstClr val="black">
+                <a:alpha val="40000"/>
+              </a:prstClr>
+            </a:outerShdw>
+          </a:effectLst>
+        </p:spPr>
+      </p:pic>
+      <p:pic>
+        <p:nvPicPr>
+          <p:cNvPr id="28" name="Image 27">
+            <a:extLst>
+              <a:ext uri="{FF2B5EF4-FFF2-40B4-BE49-F238E27FC236}">
+                <a16:creationId xmlns:a16="http://schemas.microsoft.com/office/drawing/2014/main" id="{281930DF-2052-4AB8-AF88-9B70B81CC368}"/>
+              </a:ext>
+            </a:extLst>
+          </p:cNvPr>
+          <p:cNvPicPr>
+            <a:picLocks noChangeAspect="1"/>
+          </p:cNvPicPr>
+          <p:nvPr/>
+        </p:nvPicPr>
+        <p:blipFill rotWithShape="1">
+          <a:blip r:embed="rId4">
+            <a:extLst>
+              <a:ext uri="{28A0092B-C50C-407E-A947-70E740481C1C}">
+                <a14:useLocalDpi xmlns:a14="http://schemas.microsoft.com/office/drawing/2010/main" val="0"/>
+              </a:ext>
+            </a:extLst>
+          </a:blip>
+          <a:srcRect l="64897" t="30741" b="51027"/>
+          <a:stretch/>
+        </p:blipFill>
+        <p:spPr>
+          <a:xfrm>
+            <a:off x="4576917" y="2592215"/>
+            <a:ext cx="609218" cy="324533"/>
+          </a:xfrm>
+          <a:prstGeom prst="rect">
+            <a:avLst/>
+          </a:prstGeom>
+          <a:effectLst>
+            <a:outerShdw blurRad="63500" sx="102000" sy="102000" algn="ctr" rotWithShape="0">
+              <a:prstClr val="black">
+                <a:alpha val="40000"/>
+              </a:prstClr>
+            </a:outerShdw>
+          </a:effectLst>
+        </p:spPr>
+      </p:pic>
     </p:spTree>
     <p:extLst>
       <p:ext uri="{BB962C8B-B14F-4D97-AF65-F5344CB8AC3E}">
@@ -7243,6 +7541,422 @@
       </p:transition>
     </mc:Fallback>
   </mc:AlternateContent>
+  <p:timing>
+    <p:tnLst>
+      <p:par>
+        <p:cTn id="1" dur="indefinite" restart="never" nodeType="tmRoot">
+          <p:childTnLst>
+            <p:seq concurrent="1" nextAc="seek">
+              <p:cTn id="2" dur="indefinite" nodeType="mainSeq">
+                <p:childTnLst>
+                  <p:par>
+                    <p:cTn id="3" fill="hold">
+                      <p:stCondLst>
+                        <p:cond delay="indefinite"/>
+                        <p:cond evt="onBegin" delay="0">
+                          <p:tn val="2"/>
+                        </p:cond>
+                      </p:stCondLst>
+                      <p:childTnLst>
+                        <p:par>
+                          <p:cTn id="4" fill="hold">
+                            <p:stCondLst>
+                              <p:cond delay="0"/>
+                            </p:stCondLst>
+                            <p:childTnLst>
+                              <p:par>
+                                <p:cTn id="5" presetID="2" presetClass="entr" presetSubtype="9" fill="hold" nodeType="withEffect">
+                                  <p:stCondLst>
+                                    <p:cond delay="0"/>
+                                  </p:stCondLst>
+                                  <p:childTnLst>
+                                    <p:set>
+                                      <p:cBhvr>
+                                        <p:cTn id="6" dur="1" fill="hold">
+                                          <p:stCondLst>
+                                            <p:cond delay="0"/>
+                                          </p:stCondLst>
+                                        </p:cTn>
+                                        <p:tgtEl>
+                                          <p:spTgt spid="26"/>
+                                        </p:tgtEl>
+                                        <p:attrNameLst>
+                                          <p:attrName>style.visibility</p:attrName>
+                                        </p:attrNameLst>
+                                      </p:cBhvr>
+                                      <p:to>
+                                        <p:strVal val="visible"/>
+                                      </p:to>
+                                    </p:set>
+                                    <p:anim calcmode="lin" valueType="num">
+                                      <p:cBhvr additive="base">
+                                        <p:cTn id="7" dur="400" fill="hold"/>
+                                        <p:tgtEl>
+                                          <p:spTgt spid="26"/>
+                                        </p:tgtEl>
+                                        <p:attrNameLst>
+                                          <p:attrName>ppt_x</p:attrName>
+                                        </p:attrNameLst>
+                                      </p:cBhvr>
+                                      <p:tavLst>
+                                        <p:tav tm="0">
+                                          <p:val>
+                                            <p:strVal val="0-#ppt_w/2"/>
+                                          </p:val>
+                                        </p:tav>
+                                        <p:tav tm="100000">
+                                          <p:val>
+                                            <p:strVal val="#ppt_x"/>
+                                          </p:val>
+                                        </p:tav>
+                                      </p:tavLst>
+                                    </p:anim>
+                                    <p:anim calcmode="lin" valueType="num">
+                                      <p:cBhvr additive="base">
+                                        <p:cTn id="8" dur="400" fill="hold"/>
+                                        <p:tgtEl>
+                                          <p:spTgt spid="26"/>
+                                        </p:tgtEl>
+                                        <p:attrNameLst>
+                                          <p:attrName>ppt_y</p:attrName>
+                                        </p:attrNameLst>
+                                      </p:cBhvr>
+                                      <p:tavLst>
+                                        <p:tav tm="0">
+                                          <p:val>
+                                            <p:strVal val="0-#ppt_h/2"/>
+                                          </p:val>
+                                        </p:tav>
+                                        <p:tav tm="100000">
+                                          <p:val>
+                                            <p:strVal val="#ppt_y"/>
+                                          </p:val>
+                                        </p:tav>
+                                      </p:tavLst>
+                                    </p:anim>
+                                  </p:childTnLst>
+                                </p:cTn>
+                              </p:par>
+                              <p:par>
+                                <p:cTn id="9" presetID="2" presetClass="entr" presetSubtype="1" fill="hold" nodeType="withEffect">
+                                  <p:stCondLst>
+                                    <p:cond delay="0"/>
+                                  </p:stCondLst>
+                                  <p:childTnLst>
+                                    <p:set>
+                                      <p:cBhvr>
+                                        <p:cTn id="10" dur="1" fill="hold">
+                                          <p:stCondLst>
+                                            <p:cond delay="0"/>
+                                          </p:stCondLst>
+                                        </p:cTn>
+                                        <p:tgtEl>
+                                          <p:spTgt spid="23"/>
+                                        </p:tgtEl>
+                                        <p:attrNameLst>
+                                          <p:attrName>style.visibility</p:attrName>
+                                        </p:attrNameLst>
+                                      </p:cBhvr>
+                                      <p:to>
+                                        <p:strVal val="visible"/>
+                                      </p:to>
+                                    </p:set>
+                                    <p:anim calcmode="lin" valueType="num">
+                                      <p:cBhvr additive="base">
+                                        <p:cTn id="11" dur="400" fill="hold"/>
+                                        <p:tgtEl>
+                                          <p:spTgt spid="23"/>
+                                        </p:tgtEl>
+                                        <p:attrNameLst>
+                                          <p:attrName>ppt_x</p:attrName>
+                                        </p:attrNameLst>
+                                      </p:cBhvr>
+                                      <p:tavLst>
+                                        <p:tav tm="0">
+                                          <p:val>
+                                            <p:strVal val="#ppt_x"/>
+                                          </p:val>
+                                        </p:tav>
+                                        <p:tav tm="100000">
+                                          <p:val>
+                                            <p:strVal val="#ppt_x"/>
+                                          </p:val>
+                                        </p:tav>
+                                      </p:tavLst>
+                                    </p:anim>
+                                    <p:anim calcmode="lin" valueType="num">
+                                      <p:cBhvr additive="base">
+                                        <p:cTn id="12" dur="400" fill="hold"/>
+                                        <p:tgtEl>
+                                          <p:spTgt spid="23"/>
+                                        </p:tgtEl>
+                                        <p:attrNameLst>
+                                          <p:attrName>ppt_y</p:attrName>
+                                        </p:attrNameLst>
+                                      </p:cBhvr>
+                                      <p:tavLst>
+                                        <p:tav tm="0">
+                                          <p:val>
+                                            <p:strVal val="0-#ppt_h/2"/>
+                                          </p:val>
+                                        </p:tav>
+                                        <p:tav tm="100000">
+                                          <p:val>
+                                            <p:strVal val="#ppt_y"/>
+                                          </p:val>
+                                        </p:tav>
+                                      </p:tavLst>
+                                    </p:anim>
+                                  </p:childTnLst>
+                                </p:cTn>
+                              </p:par>
+                              <p:par>
+                                <p:cTn id="13" presetID="2" presetClass="entr" presetSubtype="3" fill="hold" nodeType="withEffect">
+                                  <p:stCondLst>
+                                    <p:cond delay="0"/>
+                                  </p:stCondLst>
+                                  <p:childTnLst>
+                                    <p:set>
+                                      <p:cBhvr>
+                                        <p:cTn id="14" dur="1" fill="hold">
+                                          <p:stCondLst>
+                                            <p:cond delay="0"/>
+                                          </p:stCondLst>
+                                        </p:cTn>
+                                        <p:tgtEl>
+                                          <p:spTgt spid="28"/>
+                                        </p:tgtEl>
+                                        <p:attrNameLst>
+                                          <p:attrName>style.visibility</p:attrName>
+                                        </p:attrNameLst>
+                                      </p:cBhvr>
+                                      <p:to>
+                                        <p:strVal val="visible"/>
+                                      </p:to>
+                                    </p:set>
+                                    <p:anim calcmode="lin" valueType="num">
+                                      <p:cBhvr additive="base">
+                                        <p:cTn id="15" dur="400" fill="hold"/>
+                                        <p:tgtEl>
+                                          <p:spTgt spid="28"/>
+                                        </p:tgtEl>
+                                        <p:attrNameLst>
+                                          <p:attrName>ppt_x</p:attrName>
+                                        </p:attrNameLst>
+                                      </p:cBhvr>
+                                      <p:tavLst>
+                                        <p:tav tm="0">
+                                          <p:val>
+                                            <p:strVal val="1+#ppt_w/2"/>
+                                          </p:val>
+                                        </p:tav>
+                                        <p:tav tm="100000">
+                                          <p:val>
+                                            <p:strVal val="#ppt_x"/>
+                                          </p:val>
+                                        </p:tav>
+                                      </p:tavLst>
+                                    </p:anim>
+                                    <p:anim calcmode="lin" valueType="num">
+                                      <p:cBhvr additive="base">
+                                        <p:cTn id="16" dur="400" fill="hold"/>
+                                        <p:tgtEl>
+                                          <p:spTgt spid="28"/>
+                                        </p:tgtEl>
+                                        <p:attrNameLst>
+                                          <p:attrName>ppt_y</p:attrName>
+                                        </p:attrNameLst>
+                                      </p:cBhvr>
+                                      <p:tavLst>
+                                        <p:tav tm="0">
+                                          <p:val>
+                                            <p:strVal val="0-#ppt_h/2"/>
+                                          </p:val>
+                                        </p:tav>
+                                        <p:tav tm="100000">
+                                          <p:val>
+                                            <p:strVal val="#ppt_y"/>
+                                          </p:val>
+                                        </p:tav>
+                                      </p:tavLst>
+                                    </p:anim>
+                                  </p:childTnLst>
+                                </p:cTn>
+                              </p:par>
+                              <p:par>
+                                <p:cTn id="17" presetID="2" presetClass="entr" presetSubtype="6" fill="hold" nodeType="withEffect">
+                                  <p:stCondLst>
+                                    <p:cond delay="0"/>
+                                  </p:stCondLst>
+                                  <p:childTnLst>
+                                    <p:set>
+                                      <p:cBhvr>
+                                        <p:cTn id="18" dur="1" fill="hold">
+                                          <p:stCondLst>
+                                            <p:cond delay="0"/>
+                                          </p:stCondLst>
+                                        </p:cTn>
+                                        <p:tgtEl>
+                                          <p:spTgt spid="27"/>
+                                        </p:tgtEl>
+                                        <p:attrNameLst>
+                                          <p:attrName>style.visibility</p:attrName>
+                                        </p:attrNameLst>
+                                      </p:cBhvr>
+                                      <p:to>
+                                        <p:strVal val="visible"/>
+                                      </p:to>
+                                    </p:set>
+                                    <p:anim calcmode="lin" valueType="num">
+                                      <p:cBhvr additive="base">
+                                        <p:cTn id="19" dur="400" fill="hold"/>
+                                        <p:tgtEl>
+                                          <p:spTgt spid="27"/>
+                                        </p:tgtEl>
+                                        <p:attrNameLst>
+                                          <p:attrName>ppt_x</p:attrName>
+                                        </p:attrNameLst>
+                                      </p:cBhvr>
+                                      <p:tavLst>
+                                        <p:tav tm="0">
+                                          <p:val>
+                                            <p:strVal val="1+#ppt_w/2"/>
+                                          </p:val>
+                                        </p:tav>
+                                        <p:tav tm="100000">
+                                          <p:val>
+                                            <p:strVal val="#ppt_x"/>
+                                          </p:val>
+                                        </p:tav>
+                                      </p:tavLst>
+                                    </p:anim>
+                                    <p:anim calcmode="lin" valueType="num">
+                                      <p:cBhvr additive="base">
+                                        <p:cTn id="20" dur="400" fill="hold"/>
+                                        <p:tgtEl>
+                                          <p:spTgt spid="27"/>
+                                        </p:tgtEl>
+                                        <p:attrNameLst>
+                                          <p:attrName>ppt_y</p:attrName>
+                                        </p:attrNameLst>
+                                      </p:cBhvr>
+                                      <p:tavLst>
+                                        <p:tav tm="0">
+                                          <p:val>
+                                            <p:strVal val="1+#ppt_h/2"/>
+                                          </p:val>
+                                        </p:tav>
+                                        <p:tav tm="100000">
+                                          <p:val>
+                                            <p:strVal val="#ppt_y"/>
+                                          </p:val>
+                                        </p:tav>
+                                      </p:tavLst>
+                                    </p:anim>
+                                  </p:childTnLst>
+                                </p:cTn>
+                              </p:par>
+                              <p:par>
+                                <p:cTn id="21" presetID="2" presetClass="entr" presetSubtype="12" fill="hold" nodeType="withEffect">
+                                  <p:stCondLst>
+                                    <p:cond delay="0"/>
+                                  </p:stCondLst>
+                                  <p:childTnLst>
+                                    <p:set>
+                                      <p:cBhvr>
+                                        <p:cTn id="22" dur="1" fill="hold">
+                                          <p:stCondLst>
+                                            <p:cond delay="0"/>
+                                          </p:stCondLst>
+                                        </p:cTn>
+                                        <p:tgtEl>
+                                          <p:spTgt spid="24"/>
+                                        </p:tgtEl>
+                                        <p:attrNameLst>
+                                          <p:attrName>style.visibility</p:attrName>
+                                        </p:attrNameLst>
+                                      </p:cBhvr>
+                                      <p:to>
+                                        <p:strVal val="visible"/>
+                                      </p:to>
+                                    </p:set>
+                                    <p:anim calcmode="lin" valueType="num">
+                                      <p:cBhvr additive="base">
+                                        <p:cTn id="23" dur="400" fill="hold"/>
+                                        <p:tgtEl>
+                                          <p:spTgt spid="24"/>
+                                        </p:tgtEl>
+                                        <p:attrNameLst>
+                                          <p:attrName>ppt_x</p:attrName>
+                                        </p:attrNameLst>
+                                      </p:cBhvr>
+                                      <p:tavLst>
+                                        <p:tav tm="0">
+                                          <p:val>
+                                            <p:strVal val="0-#ppt_w/2"/>
+                                          </p:val>
+                                        </p:tav>
+                                        <p:tav tm="100000">
+                                          <p:val>
+                                            <p:strVal val="#ppt_x"/>
+                                          </p:val>
+                                        </p:tav>
+                                      </p:tavLst>
+                                    </p:anim>
+                                    <p:anim calcmode="lin" valueType="num">
+                                      <p:cBhvr additive="base">
+                                        <p:cTn id="24" dur="400" fill="hold"/>
+                                        <p:tgtEl>
+                                          <p:spTgt spid="24"/>
+                                        </p:tgtEl>
+                                        <p:attrNameLst>
+                                          <p:attrName>ppt_y</p:attrName>
+                                        </p:attrNameLst>
+                                      </p:cBhvr>
+                                      <p:tavLst>
+                                        <p:tav tm="0">
+                                          <p:val>
+                                            <p:strVal val="1+#ppt_h/2"/>
+                                          </p:val>
+                                        </p:tav>
+                                        <p:tav tm="100000">
+                                          <p:val>
+                                            <p:strVal val="#ppt_y"/>
+                                          </p:val>
+                                        </p:tav>
+                                      </p:tavLst>
+                                    </p:anim>
+                                  </p:childTnLst>
+                                </p:cTn>
+                              </p:par>
+                            </p:childTnLst>
+                          </p:cTn>
+                        </p:par>
+                      </p:childTnLst>
+                    </p:cTn>
+                  </p:par>
+                </p:childTnLst>
+              </p:cTn>
+              <p:prevCondLst>
+                <p:cond evt="onPrev" delay="0">
+                  <p:tgtEl>
+                    <p:sldTgt/>
+                  </p:tgtEl>
+                </p:cond>
+              </p:prevCondLst>
+              <p:nextCondLst>
+                <p:cond evt="onNext" delay="0">
+                  <p:tgtEl>
+                    <p:sldTgt/>
+                  </p:tgtEl>
+                </p:cond>
+              </p:nextCondLst>
+            </p:seq>
+          </p:childTnLst>
+        </p:cTn>
+      </p:par>
+    </p:tnLst>
+  </p:timing>
 </p:sld>
 </file>
 

</xml_diff>

<commit_message>
MAJ : Rapport activité, Gantt, Revue 1
</commit_message>
<xml_diff>
--- a/Nathan/Compte-rendus/REVUE-R1-GUIGAND-SFL6.pptx
+++ b/Nathan/Compte-rendus/REVUE-R1-GUIGAND-SFL6.pptx
@@ -9953,8 +9953,8 @@
         </p:nvSpPr>
         <p:spPr>
           <a:xfrm>
-            <a:off x="2926080" y="947451"/>
-            <a:ext cx="5931481" cy="3199099"/>
+            <a:off x="3639312" y="947451"/>
+            <a:ext cx="5218249" cy="3199099"/>
           </a:xfrm>
           <a:prstGeom prst="rect">
             <a:avLst/>
@@ -10706,6 +10706,60 @@
           </a:prstGeom>
           <a:solidFill>
             <a:srgbClr val="A31257"/>
+          </a:solidFill>
+          <a:ln>
+            <a:noFill/>
+          </a:ln>
+        </p:spPr>
+        <p:style>
+          <a:lnRef idx="2">
+            <a:schemeClr val="accent1">
+              <a:shade val="50000"/>
+            </a:schemeClr>
+          </a:lnRef>
+          <a:fillRef idx="1">
+            <a:schemeClr val="accent1"/>
+          </a:fillRef>
+          <a:effectRef idx="0">
+            <a:schemeClr val="accent1"/>
+          </a:effectRef>
+          <a:fontRef idx="minor">
+            <a:schemeClr val="lt1"/>
+          </a:fontRef>
+        </p:style>
+        <p:txBody>
+          <a:bodyPr rtlCol="0" anchor="ctr"/>
+          <a:lstStyle/>
+          <a:p>
+            <a:pPr algn="ctr"/>
+            <a:endParaRPr lang="fr-FR"/>
+          </a:p>
+        </p:txBody>
+      </p:sp>
+      <p:sp>
+        <p:nvSpPr>
+          <p:cNvPr id="25" name="Rectangle 24">
+            <a:extLst>
+              <a:ext uri="{FF2B5EF4-FFF2-40B4-BE49-F238E27FC236}">
+                <a16:creationId xmlns:a16="http://schemas.microsoft.com/office/drawing/2014/main" id="{5A59C821-7AB3-476E-B068-5F29B4D0712C}"/>
+              </a:ext>
+            </a:extLst>
+          </p:cNvPr>
+          <p:cNvSpPr/>
+          <p:nvPr/>
+        </p:nvSpPr>
+        <p:spPr>
+          <a:xfrm>
+            <a:off x="2926080" y="936993"/>
+            <a:ext cx="713229" cy="1861341"/>
+          </a:xfrm>
+          <a:prstGeom prst="rect">
+            <a:avLst/>
+          </a:prstGeom>
+          <a:solidFill>
+            <a:schemeClr val="accent1">
+              <a:alpha val="35000"/>
+            </a:schemeClr>
           </a:solidFill>
           <a:ln>
             <a:noFill/>
@@ -12567,7 +12621,7 @@
         <p:spPr>
           <a:xfrm>
             <a:off x="1701832" y="5148140"/>
-            <a:ext cx="5928687" cy="1612174"/>
+            <a:ext cx="6457096" cy="1612174"/>
           </a:xfrm>
           <a:prstGeom prst="rect">
             <a:avLst/>
@@ -12653,7 +12707,15 @@
                   <a:schemeClr val="tx1"/>
                 </a:solidFill>
               </a:rPr>
-              <a:t>Installation clé WIFI sur Raspberry</a:t>
+              <a:t>Installation clé WIFI sur Raspberry </a:t>
+            </a:r>
+            <a:r>
+              <a:rPr lang="fr-FR" i="1" dirty="0">
+                <a:solidFill>
+                  <a:schemeClr val="tx1"/>
+                </a:solidFill>
+              </a:rPr>
+              <a:t>-&gt; TP Link WN725N</a:t>
             </a:r>
           </a:p>
           <a:p>

</xml_diff>

<commit_message>
MAJ Gantt et REVUE 1
</commit_message>
<xml_diff>
--- a/Nathan/Compte-rendus/REVUE-R1-GUIGAND-SFL6.pptx
+++ b/Nathan/Compte-rendus/REVUE-R1-GUIGAND-SFL6.pptx
@@ -11854,7 +11854,7 @@
         <p:spPr>
           <a:xfrm>
             <a:off x="143436" y="1886284"/>
-            <a:ext cx="4067728" cy="2527541"/>
+            <a:ext cx="4245684" cy="2527541"/>
           </a:xfrm>
           <a:prstGeom prst="rect">
             <a:avLst/>
@@ -11954,7 +11954,7 @@
                   <a:schemeClr val="tx1"/>
                 </a:solidFill>
               </a:rPr>
-              <a:t>Envoie d’un indice à l’afficheur</a:t>
+              <a:t>Envoyer un indice à l’afficheur</a:t>
             </a:r>
           </a:p>
           <a:p>
@@ -12395,7 +12395,7 @@
                   <a:schemeClr val="tx1"/>
                 </a:solidFill>
               </a:rPr>
-              <a:t>Chronomètre</a:t>
+              <a:t>(Chronomètre)</a:t>
             </a:r>
           </a:p>
         </p:txBody>
@@ -12411,13 +12411,14 @@
           </p:cNvPr>
           <p:cNvCxnSpPr>
             <a:cxnSpLocks/>
+            <a:endCxn id="22" idx="1"/>
           </p:cNvCxnSpPr>
           <p:nvPr/>
         </p:nvCxnSpPr>
         <p:spPr>
           <a:xfrm flipV="1">
-            <a:off x="3344249" y="3165081"/>
-            <a:ext cx="1721527" cy="422550"/>
+            <a:off x="4233221" y="3150054"/>
+            <a:ext cx="904700" cy="415138"/>
           </a:xfrm>
           <a:prstGeom prst="straightConnector1">
             <a:avLst/>

</xml_diff>

<commit_message>
Création d'une présentation visuelle pour l'application de supervision
</commit_message>
<xml_diff>
--- a/Nathan/Compte-rendus/REVUE-R1-GUIGAND-SFL6.pptx
+++ b/Nathan/Compte-rendus/REVUE-R1-GUIGAND-SFL6.pptx
@@ -11853,8 +11853,8 @@
         </p:nvSpPr>
         <p:spPr>
           <a:xfrm>
-            <a:off x="143436" y="1886284"/>
-            <a:ext cx="4245684" cy="2527541"/>
+            <a:off x="143436" y="1816390"/>
+            <a:ext cx="4023468" cy="2734124"/>
           </a:xfrm>
           <a:prstGeom prst="rect">
             <a:avLst/>
@@ -12417,8 +12417,8 @@
         </p:nvCxnSpPr>
         <p:spPr>
           <a:xfrm flipV="1">
-            <a:off x="4233221" y="3150054"/>
-            <a:ext cx="904700" cy="415138"/>
+            <a:off x="3511296" y="3150054"/>
+            <a:ext cx="1626625" cy="343902"/>
           </a:xfrm>
           <a:prstGeom prst="straightConnector1">
             <a:avLst/>

</xml_diff>

<commit_message>
Poursuite du diaporama de revue 2.
</commit_message>
<xml_diff>
--- a/Nathan/Compte-rendus/REVUE-R1-GUIGAND-SFL6.pptx
+++ b/Nathan/Compte-rendus/REVUE-R1-GUIGAND-SFL6.pptx
@@ -203,7 +203,7 @@
           <a:p>
             <a:fld id="{8F776215-2538-4AC2-BB65-76E63FC63770}" type="datetimeFigureOut">
               <a:rPr lang="fr-FR" smtClean="0"/>
-              <a:t>04/02/2020</a:t>
+              <a:t>06/03/2020</a:t>
             </a:fld>
             <a:endParaRPr lang="fr-FR"/>
           </a:p>
@@ -1193,7 +1193,7 @@
             <a:fld id="{B61BEF0D-F0BB-DE4B-95CE-6DB70DBA9567}" type="datetimeFigureOut">
               <a:rPr lang="en-US" smtClean="0"/>
               <a:pPr/>
-              <a:t>2/4/2020</a:t>
+              <a:t>3/6/2020</a:t>
             </a:fld>
             <a:endParaRPr lang="en-US" dirty="0"/>
           </a:p>
@@ -1441,7 +1441,7 @@
             <a:fld id="{B61BEF0D-F0BB-DE4B-95CE-6DB70DBA9567}" type="datetimeFigureOut">
               <a:rPr lang="en-US" smtClean="0"/>
               <a:pPr/>
-              <a:t>2/4/2020</a:t>
+              <a:t>3/6/2020</a:t>
             </a:fld>
             <a:endParaRPr lang="en-US" dirty="0"/>
           </a:p>
@@ -1752,7 +1752,7 @@
             <a:fld id="{B61BEF0D-F0BB-DE4B-95CE-6DB70DBA9567}" type="datetimeFigureOut">
               <a:rPr lang="en-US" smtClean="0"/>
               <a:pPr/>
-              <a:t>2/4/2020</a:t>
+              <a:t>3/6/2020</a:t>
             </a:fld>
             <a:endParaRPr lang="en-US" dirty="0"/>
           </a:p>
@@ -2090,7 +2090,7 @@
             <a:fld id="{B61BEF0D-F0BB-DE4B-95CE-6DB70DBA9567}" type="datetimeFigureOut">
               <a:rPr lang="en-US" smtClean="0"/>
               <a:pPr/>
-              <a:t>2/4/2020</a:t>
+              <a:t>3/6/2020</a:t>
             </a:fld>
             <a:endParaRPr lang="en-US" dirty="0"/>
           </a:p>
@@ -2401,7 +2401,7 @@
             <a:fld id="{B61BEF0D-F0BB-DE4B-95CE-6DB70DBA9567}" type="datetimeFigureOut">
               <a:rPr lang="en-US" smtClean="0"/>
               <a:pPr/>
-              <a:t>2/4/2020</a:t>
+              <a:t>3/6/2020</a:t>
             </a:fld>
             <a:endParaRPr lang="en-US" dirty="0"/>
           </a:p>
@@ -2791,7 +2791,7 @@
             <a:fld id="{B61BEF0D-F0BB-DE4B-95CE-6DB70DBA9567}" type="datetimeFigureOut">
               <a:rPr lang="en-US" smtClean="0"/>
               <a:pPr/>
-              <a:t>2/4/2020</a:t>
+              <a:t>3/6/2020</a:t>
             </a:fld>
             <a:endParaRPr lang="en-US" dirty="0"/>
           </a:p>
@@ -2957,7 +2957,7 @@
           <a:p>
             <a:fld id="{55C6B4A9-1611-4792-9094-5F34BCA07E0B}" type="datetimeFigureOut">
               <a:rPr lang="en-US" smtClean="0"/>
-              <a:t>2/4/2020</a:t>
+              <a:t>3/6/2020</a:t>
             </a:fld>
             <a:endParaRPr lang="en-US" dirty="0"/>
           </a:p>
@@ -3133,7 +3133,7 @@
             <a:fld id="{B61BEF0D-F0BB-DE4B-95CE-6DB70DBA9567}" type="datetimeFigureOut">
               <a:rPr lang="en-US" smtClean="0"/>
               <a:pPr/>
-              <a:t>2/4/2020</a:t>
+              <a:t>3/6/2020</a:t>
             </a:fld>
             <a:endParaRPr lang="en-US" dirty="0"/>
           </a:p>
@@ -3306,7 +3306,7 @@
             <a:fld id="{B61BEF0D-F0BB-DE4B-95CE-6DB70DBA9567}" type="datetimeFigureOut">
               <a:rPr lang="en-US" smtClean="0"/>
               <a:pPr/>
-              <a:t>2/4/2020</a:t>
+              <a:t>3/6/2020</a:t>
             </a:fld>
             <a:endParaRPr lang="en-US" dirty="0"/>
           </a:p>
@@ -3550,7 +3550,7 @@
             <a:fld id="{B61BEF0D-F0BB-DE4B-95CE-6DB70DBA9567}" type="datetimeFigureOut">
               <a:rPr lang="en-US" smtClean="0"/>
               <a:pPr/>
-              <a:t>2/4/2020</a:t>
+              <a:t>3/6/2020</a:t>
             </a:fld>
             <a:endParaRPr lang="en-US" dirty="0"/>
           </a:p>
@@ -3778,7 +3778,7 @@
           <a:p>
             <a:fld id="{EB712588-04B1-427B-82EE-E8DB90309F08}" type="datetimeFigureOut">
               <a:rPr lang="en-US" smtClean="0"/>
-              <a:t>2/4/2020</a:t>
+              <a:t>3/6/2020</a:t>
             </a:fld>
             <a:endParaRPr lang="en-US" dirty="0"/>
           </a:p>
@@ -4148,7 +4148,7 @@
             <a:fld id="{B61BEF0D-F0BB-DE4B-95CE-6DB70DBA9567}" type="datetimeFigureOut">
               <a:rPr lang="en-US" smtClean="0"/>
               <a:pPr/>
-              <a:t>2/4/2020</a:t>
+              <a:t>3/6/2020</a:t>
             </a:fld>
             <a:endParaRPr lang="en-US" dirty="0"/>
           </a:p>
@@ -4268,7 +4268,7 @@
             <a:fld id="{B61BEF0D-F0BB-DE4B-95CE-6DB70DBA9567}" type="datetimeFigureOut">
               <a:rPr lang="en-US" smtClean="0"/>
               <a:pPr/>
-              <a:t>2/4/2020</a:t>
+              <a:t>3/6/2020</a:t>
             </a:fld>
             <a:endParaRPr lang="en-US" dirty="0"/>
           </a:p>
@@ -4360,7 +4360,7 @@
             <a:fld id="{B61BEF0D-F0BB-DE4B-95CE-6DB70DBA9567}" type="datetimeFigureOut">
               <a:rPr lang="en-US" smtClean="0"/>
               <a:pPr/>
-              <a:t>2/4/2020</a:t>
+              <a:t>3/6/2020</a:t>
             </a:fld>
             <a:endParaRPr lang="en-US" dirty="0"/>
           </a:p>
@@ -4611,7 +4611,7 @@
           <a:p>
             <a:fld id="{42A54C80-263E-416B-A8E0-580EDEADCBDC}" type="datetimeFigureOut">
               <a:rPr lang="en-US" smtClean="0"/>
-              <a:t>2/4/2020</a:t>
+              <a:t>3/6/2020</a:t>
             </a:fld>
             <a:endParaRPr lang="en-US" dirty="0"/>
           </a:p>
@@ -4870,7 +4870,7 @@
             <a:fld id="{B61BEF0D-F0BB-DE4B-95CE-6DB70DBA9567}" type="datetimeFigureOut">
               <a:rPr lang="en-US" smtClean="0"/>
               <a:pPr/>
-              <a:t>2/4/2020</a:t>
+              <a:t>3/6/2020</a:t>
             </a:fld>
             <a:endParaRPr lang="en-US" dirty="0"/>
           </a:p>
@@ -5610,7 +5610,7 @@
             <a:fld id="{B61BEF0D-F0BB-DE4B-95CE-6DB70DBA9567}" type="datetimeFigureOut">
               <a:rPr lang="en-US" smtClean="0"/>
               <a:pPr/>
-              <a:t>2/4/2020</a:t>
+              <a:t>3/6/2020</a:t>
             </a:fld>
             <a:endParaRPr lang="en-US" dirty="0"/>
           </a:p>

</xml_diff>